<commit_message>
Updated video link on Week4 ppt
</commit_message>
<xml_diff>
--- a/Week-04/Week-04_ConditionalFunctionsAndDataValidation.pptx
+++ b/Week-04/Week-04_ConditionalFunctionsAndDataValidation.pptx
@@ -974,7 +974,7 @@
           <a:p>
             <a:fld id="{FD29A1BE-704B-408E-AC54-DB5007F9FC79}" type="datetimeFigureOut">
               <a:rPr lang="en-US" smtClean="0"/>
-              <a:t>8/2/2022</a:t>
+              <a:t>8/3/2022</a:t>
             </a:fld>
             <a:endParaRPr lang="en-US"/>
           </a:p>
@@ -2237,7 +2237,7 @@
           <a:p>
             <a:fld id="{2C6FF9A6-8E7D-412C-A4AD-F25884266C28}" type="datetimeFigureOut">
               <a:rPr lang="en-US" smtClean="0"/>
-              <a:t>8/2/2022</a:t>
+              <a:t>8/3/2022</a:t>
             </a:fld>
             <a:endParaRPr lang="en-US"/>
           </a:p>
@@ -2435,7 +2435,7 @@
           <a:p>
             <a:fld id="{2C6FF9A6-8E7D-412C-A4AD-F25884266C28}" type="datetimeFigureOut">
               <a:rPr lang="en-US" smtClean="0"/>
-              <a:t>8/2/2022</a:t>
+              <a:t>8/3/2022</a:t>
             </a:fld>
             <a:endParaRPr lang="en-US"/>
           </a:p>
@@ -2643,7 +2643,7 @@
           <a:p>
             <a:fld id="{2C6FF9A6-8E7D-412C-A4AD-F25884266C28}" type="datetimeFigureOut">
               <a:rPr lang="en-US" smtClean="0"/>
-              <a:t>8/2/2022</a:t>
+              <a:t>8/3/2022</a:t>
             </a:fld>
             <a:endParaRPr lang="en-US"/>
           </a:p>
@@ -2841,7 +2841,7 @@
           <a:p>
             <a:fld id="{2C6FF9A6-8E7D-412C-A4AD-F25884266C28}" type="datetimeFigureOut">
               <a:rPr lang="en-US" smtClean="0"/>
-              <a:t>8/2/2022</a:t>
+              <a:t>8/3/2022</a:t>
             </a:fld>
             <a:endParaRPr lang="en-US"/>
           </a:p>
@@ -3116,7 +3116,7 @@
           <a:p>
             <a:fld id="{2C6FF9A6-8E7D-412C-A4AD-F25884266C28}" type="datetimeFigureOut">
               <a:rPr lang="en-US" smtClean="0"/>
-              <a:t>8/2/2022</a:t>
+              <a:t>8/3/2022</a:t>
             </a:fld>
             <a:endParaRPr lang="en-US"/>
           </a:p>
@@ -3381,7 +3381,7 @@
           <a:p>
             <a:fld id="{2C6FF9A6-8E7D-412C-A4AD-F25884266C28}" type="datetimeFigureOut">
               <a:rPr lang="en-US" smtClean="0"/>
-              <a:t>8/2/2022</a:t>
+              <a:t>8/3/2022</a:t>
             </a:fld>
             <a:endParaRPr lang="en-US"/>
           </a:p>
@@ -3793,7 +3793,7 @@
           <a:p>
             <a:fld id="{2C6FF9A6-8E7D-412C-A4AD-F25884266C28}" type="datetimeFigureOut">
               <a:rPr lang="en-US" smtClean="0"/>
-              <a:t>8/2/2022</a:t>
+              <a:t>8/3/2022</a:t>
             </a:fld>
             <a:endParaRPr lang="en-US"/>
           </a:p>
@@ -3934,7 +3934,7 @@
           <a:p>
             <a:fld id="{2C6FF9A6-8E7D-412C-A4AD-F25884266C28}" type="datetimeFigureOut">
               <a:rPr lang="en-US" smtClean="0"/>
-              <a:t>8/2/2022</a:t>
+              <a:t>8/3/2022</a:t>
             </a:fld>
             <a:endParaRPr lang="en-US"/>
           </a:p>
@@ -4047,7 +4047,7 @@
           <a:p>
             <a:fld id="{2C6FF9A6-8E7D-412C-A4AD-F25884266C28}" type="datetimeFigureOut">
               <a:rPr lang="en-US" smtClean="0"/>
-              <a:t>8/2/2022</a:t>
+              <a:t>8/3/2022</a:t>
             </a:fld>
             <a:endParaRPr lang="en-US"/>
           </a:p>
@@ -4358,7 +4358,7 @@
           <a:p>
             <a:fld id="{2C6FF9A6-8E7D-412C-A4AD-F25884266C28}" type="datetimeFigureOut">
               <a:rPr lang="en-US" smtClean="0"/>
-              <a:t>8/2/2022</a:t>
+              <a:t>8/3/2022</a:t>
             </a:fld>
             <a:endParaRPr lang="en-US"/>
           </a:p>
@@ -4646,7 +4646,7 @@
           <a:p>
             <a:fld id="{2C6FF9A6-8E7D-412C-A4AD-F25884266C28}" type="datetimeFigureOut">
               <a:rPr lang="en-US" smtClean="0"/>
-              <a:t>8/2/2022</a:t>
+              <a:t>8/3/2022</a:t>
             </a:fld>
             <a:endParaRPr lang="en-US"/>
           </a:p>
@@ -4887,7 +4887,7 @@
           <a:p>
             <a:fld id="{2C6FF9A6-8E7D-412C-A4AD-F25884266C28}" type="datetimeFigureOut">
               <a:rPr lang="en-US" smtClean="0"/>
-              <a:t>8/2/2022</a:t>
+              <a:t>8/3/2022</a:t>
             </a:fld>
             <a:endParaRPr lang="en-US"/>
           </a:p>
@@ -9001,18 +9001,18 @@
 </file>
 
 <file path=customXml/item1.xml><?xml version="1.0" encoding="utf-8"?>
+<p:properties xmlns:p="http://schemas.microsoft.com/office/2006/metadata/properties" xmlns:xsi="http://www.w3.org/2001/XMLSchema-instance" xmlns:pc="http://schemas.microsoft.com/office/infopath/2007/PartnerControls">
+  <documentManagement/>
+</p:properties>
+</file>
+
+<file path=customXml/item2.xml><?xml version="1.0" encoding="utf-8"?>
 <?mso-contentType ?>
 <FormTemplates xmlns="http://schemas.microsoft.com/sharepoint/v3/contenttype/forms">
   <Display>DocumentLibraryForm</Display>
   <Edit>DocumentLibraryForm</Edit>
   <New>DocumentLibraryForm</New>
 </FormTemplates>
-</file>
-
-<file path=customXml/item2.xml><?xml version="1.0" encoding="utf-8"?>
-<p:properties xmlns:p="http://schemas.microsoft.com/office/2006/metadata/properties" xmlns:xsi="http://www.w3.org/2001/XMLSchema-instance" xmlns:pc="http://schemas.microsoft.com/office/infopath/2007/PartnerControls">
-  <documentManagement/>
-</p:properties>
 </file>
 
 <file path=customXml/item3.xml><?xml version="1.0" encoding="utf-8"?>
@@ -9195,14 +9195,6 @@
 </file>
 
 <file path=customXml/itemProps1.xml><?xml version="1.0" encoding="utf-8"?>
-<ds:datastoreItem xmlns:ds="http://schemas.openxmlformats.org/officeDocument/2006/customXml" ds:itemID="{8ADF127F-DA0B-482F-97E0-90B52A503C8D}">
-  <ds:schemaRefs>
-    <ds:schemaRef ds:uri="http://schemas.microsoft.com/sharepoint/v3/contenttype/forms"/>
-  </ds:schemaRefs>
-</ds:datastoreItem>
-</file>
-
-<file path=customXml/itemProps2.xml><?xml version="1.0" encoding="utf-8"?>
 <ds:datastoreItem xmlns:ds="http://schemas.openxmlformats.org/officeDocument/2006/customXml" ds:itemID="{EBB40029-5245-4DBF-95C2-47B86CF70C9F}">
   <ds:schemaRefs>
     <ds:schemaRef ds:uri="http://schemas.openxmlformats.org/package/2006/metadata/core-properties"/>
@@ -9215,6 +9207,14 @@
     <ds:schemaRef ds:uri="http://purl.org/dc/terms/"/>
     <ds:schemaRef ds:uri="8424d317-e79a-4f10-a77e-d0bbf29883f4"/>
     <ds:schemaRef ds:uri="5a3927fa-f9bf-4e21-9816-7f925d835449"/>
+  </ds:schemaRefs>
+</ds:datastoreItem>
+</file>
+
+<file path=customXml/itemProps2.xml><?xml version="1.0" encoding="utf-8"?>
+<ds:datastoreItem xmlns:ds="http://schemas.openxmlformats.org/officeDocument/2006/customXml" ds:itemID="{8ADF127F-DA0B-482F-97E0-90B52A503C8D}">
+  <ds:schemaRefs>
+    <ds:schemaRef ds:uri="http://schemas.microsoft.com/sharepoint/v3/contenttype/forms"/>
   </ds:schemaRefs>
 </ds:datastoreItem>
 </file>

</xml_diff>

<commit_message>
Updated formula on Week4 ppt slide 7
</commit_message>
<xml_diff>
--- a/Week-04/Week-04_ConditionalFunctionsAndDataValidation.pptx
+++ b/Week-04/Week-04_ConditionalFunctionsAndDataValidation.pptx
@@ -7598,10 +7598,10 @@
       </p:sp>
       <p:pic>
         <p:nvPicPr>
-          <p:cNvPr id="8" name="Picture 7">
+          <p:cNvPr id="4" name="Picture 3">
             <a:extLst>
               <a:ext uri="{FF2B5EF4-FFF2-40B4-BE49-F238E27FC236}">
-                <a16:creationId xmlns:a16="http://schemas.microsoft.com/office/drawing/2014/main" id="{67A3A21C-1CEA-8478-9E04-4ADB95E820A8}"/>
+                <a16:creationId xmlns:a16="http://schemas.microsoft.com/office/drawing/2014/main" id="{5AC56EA3-56A4-3C9F-6D6B-30E1EE40CE05}"/>
               </a:ext>
             </a:extLst>
           </p:cNvPr>
@@ -7618,8 +7618,8 @@
         </p:blipFill>
         <p:spPr>
           <a:xfrm>
-            <a:off x="2300287" y="2833530"/>
-            <a:ext cx="7591425" cy="3238500"/>
+            <a:off x="1941739" y="2541531"/>
+            <a:ext cx="7938486" cy="3435960"/>
           </a:xfrm>
           <a:prstGeom prst="rect">
             <a:avLst/>

</xml_diff>

<commit_message>
Another update to screenshot on Week4 ppt slide 7
</commit_message>
<xml_diff>
--- a/Week-04/Week-04_ConditionalFunctionsAndDataValidation.pptx
+++ b/Week-04/Week-04_ConditionalFunctionsAndDataValidation.pptx
@@ -7598,10 +7598,10 @@
       </p:sp>
       <p:pic>
         <p:nvPicPr>
-          <p:cNvPr id="4" name="Picture 3">
+          <p:cNvPr id="11" name="Picture 10">
             <a:extLst>
               <a:ext uri="{FF2B5EF4-FFF2-40B4-BE49-F238E27FC236}">
-                <a16:creationId xmlns:a16="http://schemas.microsoft.com/office/drawing/2014/main" id="{5AC56EA3-56A4-3C9F-6D6B-30E1EE40CE05}"/>
+                <a16:creationId xmlns:a16="http://schemas.microsoft.com/office/drawing/2014/main" id="{C7F2DA6E-F4BF-629F-29BC-05EFAB3834BF}"/>
               </a:ext>
             </a:extLst>
           </p:cNvPr>
@@ -7618,8 +7618,8 @@
         </p:blipFill>
         <p:spPr>
           <a:xfrm>
-            <a:off x="1941739" y="2541531"/>
-            <a:ext cx="7938486" cy="3435960"/>
+            <a:off x="1941739" y="2571618"/>
+            <a:ext cx="7611307" cy="3276732"/>
           </a:xfrm>
           <a:prstGeom prst="rect">
             <a:avLst/>

</xml_diff>